<commit_message>
Update Assignment 1 Presentation.pptx
</commit_message>
<xml_diff>
--- a/Presentations/Assignment 1 Presentation.pptx
+++ b/Presentations/Assignment 1 Presentation.pptx
@@ -280,7 +280,7 @@
           <a:p>
             <a:fld id="{12B3CF37-ABD8-43A8-A940-E787B28D1AE5}" type="datetimeFigureOut">
               <a:rPr lang="en-US" smtClean="0"/>
-              <a:t>2/17/2020</a:t>
+              <a:t>2/18/2020</a:t>
             </a:fld>
             <a:endParaRPr lang="en-US"/>
           </a:p>
@@ -478,7 +478,7 @@
           <a:p>
             <a:fld id="{12B3CF37-ABD8-43A8-A940-E787B28D1AE5}" type="datetimeFigureOut">
               <a:rPr lang="en-US" smtClean="0"/>
-              <a:t>2/17/2020</a:t>
+              <a:t>2/18/2020</a:t>
             </a:fld>
             <a:endParaRPr lang="en-US"/>
           </a:p>
@@ -686,7 +686,7 @@
           <a:p>
             <a:fld id="{12B3CF37-ABD8-43A8-A940-E787B28D1AE5}" type="datetimeFigureOut">
               <a:rPr lang="en-US" smtClean="0"/>
-              <a:t>2/17/2020</a:t>
+              <a:t>2/18/2020</a:t>
             </a:fld>
             <a:endParaRPr lang="en-US"/>
           </a:p>
@@ -884,7 +884,7 @@
           <a:p>
             <a:fld id="{12B3CF37-ABD8-43A8-A940-E787B28D1AE5}" type="datetimeFigureOut">
               <a:rPr lang="en-US" smtClean="0"/>
-              <a:t>2/17/2020</a:t>
+              <a:t>2/18/2020</a:t>
             </a:fld>
             <a:endParaRPr lang="en-US"/>
           </a:p>
@@ -1159,7 +1159,7 @@
           <a:p>
             <a:fld id="{12B3CF37-ABD8-43A8-A940-E787B28D1AE5}" type="datetimeFigureOut">
               <a:rPr lang="en-US" smtClean="0"/>
-              <a:t>2/17/2020</a:t>
+              <a:t>2/18/2020</a:t>
             </a:fld>
             <a:endParaRPr lang="en-US"/>
           </a:p>
@@ -1424,7 +1424,7 @@
           <a:p>
             <a:fld id="{12B3CF37-ABD8-43A8-A940-E787B28D1AE5}" type="datetimeFigureOut">
               <a:rPr lang="en-US" smtClean="0"/>
-              <a:t>2/17/2020</a:t>
+              <a:t>2/18/2020</a:t>
             </a:fld>
             <a:endParaRPr lang="en-US"/>
           </a:p>
@@ -1836,7 +1836,7 @@
           <a:p>
             <a:fld id="{12B3CF37-ABD8-43A8-A940-E787B28D1AE5}" type="datetimeFigureOut">
               <a:rPr lang="en-US" smtClean="0"/>
-              <a:t>2/17/2020</a:t>
+              <a:t>2/18/2020</a:t>
             </a:fld>
             <a:endParaRPr lang="en-US"/>
           </a:p>
@@ -1977,7 +1977,7 @@
           <a:p>
             <a:fld id="{12B3CF37-ABD8-43A8-A940-E787B28D1AE5}" type="datetimeFigureOut">
               <a:rPr lang="en-US" smtClean="0"/>
-              <a:t>2/17/2020</a:t>
+              <a:t>2/18/2020</a:t>
             </a:fld>
             <a:endParaRPr lang="en-US"/>
           </a:p>
@@ -2090,7 +2090,7 @@
           <a:p>
             <a:fld id="{12B3CF37-ABD8-43A8-A940-E787B28D1AE5}" type="datetimeFigureOut">
               <a:rPr lang="en-US" smtClean="0"/>
-              <a:t>2/17/2020</a:t>
+              <a:t>2/18/2020</a:t>
             </a:fld>
             <a:endParaRPr lang="en-US"/>
           </a:p>
@@ -2401,7 +2401,7 @@
           <a:p>
             <a:fld id="{12B3CF37-ABD8-43A8-A940-E787B28D1AE5}" type="datetimeFigureOut">
               <a:rPr lang="en-US" smtClean="0"/>
-              <a:t>2/17/2020</a:t>
+              <a:t>2/18/2020</a:t>
             </a:fld>
             <a:endParaRPr lang="en-US"/>
           </a:p>
@@ -2689,7 +2689,7 @@
           <a:p>
             <a:fld id="{12B3CF37-ABD8-43A8-A940-E787B28D1AE5}" type="datetimeFigureOut">
               <a:rPr lang="en-US" smtClean="0"/>
-              <a:t>2/17/2020</a:t>
+              <a:t>2/18/2020</a:t>
             </a:fld>
             <a:endParaRPr lang="en-US"/>
           </a:p>
@@ -2930,7 +2930,7 @@
           <a:p>
             <a:fld id="{12B3CF37-ABD8-43A8-A940-E787B28D1AE5}" type="datetimeFigureOut">
               <a:rPr lang="en-US" smtClean="0"/>
-              <a:t>2/17/2020</a:t>
+              <a:t>2/18/2020</a:t>
             </a:fld>
             <a:endParaRPr lang="en-US"/>
           </a:p>
@@ -3374,8 +3374,12 @@
           <a:lstStyle/>
           <a:p>
             <a:r>
+              <a:rPr lang="en-US"/>
+              <a:t>MCU TNC Assignment </a:t>
+            </a:r>
+            <a:r>
               <a:rPr lang="en-US" dirty="0"/>
-              <a:t>TNC MCU Assignment 1</a:t>
+              <a:t>1</a:t>
             </a:r>
           </a:p>
         </p:txBody>

</xml_diff>